<commit_message>
Mise à jour pptx + graphique question f)
</commit_message>
<xml_diff>
--- a/Devoir 2/doc/Devoir_2.pptx
+++ b/Devoir 2/doc/Devoir_2.pptx
@@ -5,7 +5,7 @@
     <p:sldMasterId id="2147483660" r:id="rId1"/>
   </p:sldMasterIdLst>
   <p:notesMasterIdLst>
-    <p:notesMasterId r:id="rId7"/>
+    <p:notesMasterId r:id="rId8"/>
   </p:notesMasterIdLst>
   <p:sldIdLst>
     <p:sldId id="277" r:id="rId2"/>
@@ -13,6 +13,7 @@
     <p:sldId id="283" r:id="rId4"/>
     <p:sldId id="284" r:id="rId5"/>
     <p:sldId id="285" r:id="rId6"/>
+    <p:sldId id="286" r:id="rId7"/>
   </p:sldIdLst>
   <p:sldSz cx="12192000" cy="6858000"/>
   <p:notesSz cx="6858000" cy="9144000"/>
@@ -122,7 +123,7 @@
 <file path=ppt/revisionInfo.xml><?xml version="1.0" encoding="utf-8"?>
 <p1510:revInfo xmlns:a="http://schemas.openxmlformats.org/drawingml/2006/main" xmlns:r="http://schemas.openxmlformats.org/officeDocument/2006/relationships" xmlns:p1510="http://schemas.microsoft.com/office/powerpoint/2015/10/main">
   <p1510:revLst>
-    <p1510:client id="{B829F0FB-9251-4F38-9864-9D3AC8119E91}" v="236" dt="2025-03-09T21:43:42.647"/>
+    <p1510:client id="{B829F0FB-9251-4F38-9864-9D3AC8119E91}" v="408" dt="2025-03-09T21:59:50.833"/>
   </p1510:revLst>
 </p1510:revInfo>
 </file>
@@ -131,8 +132,8 @@
 <pc:chgInfo xmlns:a="http://schemas.openxmlformats.org/drawingml/2006/main" xmlns:r="http://schemas.openxmlformats.org/officeDocument/2006/relationships" xmlns:ac="http://schemas.microsoft.com/office/drawing/2013/main/command" xmlns:pc="http://schemas.microsoft.com/office/powerpoint/2013/main/command">
   <pc:docChgLst>
     <pc:chgData name="Louis-Simon Castonguay" userId="12a0b372677e56a6" providerId="LiveId" clId="{B829F0FB-9251-4F38-9864-9D3AC8119E91}"/>
-    <pc:docChg chg="undo custSel delSld modSld">
-      <pc:chgData name="Louis-Simon Castonguay" userId="12a0b372677e56a6" providerId="LiveId" clId="{B829F0FB-9251-4F38-9864-9D3AC8119E91}" dt="2025-03-09T21:43:42.647" v="963" actId="404"/>
+    <pc:docChg chg="undo custSel addSld delSld modSld">
+      <pc:chgData name="Louis-Simon Castonguay" userId="12a0b372677e56a6" providerId="LiveId" clId="{B829F0FB-9251-4F38-9864-9D3AC8119E91}" dt="2025-03-09T22:02:21.339" v="1597" actId="1076"/>
       <pc:docMkLst>
         <pc:docMk/>
       </pc:docMkLst>
@@ -203,6 +204,76 @@
             <ac:picMk id="2" creationId="{CBEBB497-6AB7-8E1B-A194-94E650675A6A}"/>
           </ac:picMkLst>
         </pc:picChg>
+      </pc:sldChg>
+      <pc:sldChg chg="addSp delSp modSp add mod">
+        <pc:chgData name="Louis-Simon Castonguay" userId="12a0b372677e56a6" providerId="LiveId" clId="{B829F0FB-9251-4F38-9864-9D3AC8119E91}" dt="2025-03-09T22:02:21.339" v="1597" actId="1076"/>
+        <pc:sldMkLst>
+          <pc:docMk/>
+          <pc:sldMk cId="2049930980" sldId="286"/>
+        </pc:sldMkLst>
+        <pc:spChg chg="add del mod">
+          <ac:chgData name="Louis-Simon Castonguay" userId="12a0b372677e56a6" providerId="LiveId" clId="{B829F0FB-9251-4F38-9864-9D3AC8119E91}" dt="2025-03-09T21:52:21.840" v="1031" actId="478"/>
+          <ac:spMkLst>
+            <pc:docMk/>
+            <pc:sldMk cId="2049930980" sldId="286"/>
+            <ac:spMk id="2" creationId="{5F5582F8-56A5-EC1C-301E-98A40918E782}"/>
+          </ac:spMkLst>
+        </pc:spChg>
+        <pc:spChg chg="mod">
+          <ac:chgData name="Louis-Simon Castonguay" userId="12a0b372677e56a6" providerId="LiveId" clId="{B829F0FB-9251-4F38-9864-9D3AC8119E91}" dt="2025-03-09T21:52:24.525" v="1032" actId="20577"/>
+          <ac:spMkLst>
+            <pc:docMk/>
+            <pc:sldMk cId="2049930980" sldId="286"/>
+            <ac:spMk id="3" creationId="{4352DFF7-03E4-82CB-AFEF-08DCAC3697A6}"/>
+          </ac:spMkLst>
+        </pc:spChg>
+        <pc:spChg chg="del mod">
+          <ac:chgData name="Louis-Simon Castonguay" userId="12a0b372677e56a6" providerId="LiveId" clId="{B829F0FB-9251-4F38-9864-9D3AC8119E91}" dt="2025-03-09T21:51:26.330" v="1020" actId="478"/>
+          <ac:spMkLst>
+            <pc:docMk/>
+            <pc:sldMk cId="2049930980" sldId="286"/>
+            <ac:spMk id="5" creationId="{88980301-D3F8-DA35-2F6B-CF3A5F643530}"/>
+          </ac:spMkLst>
+        </pc:spChg>
+        <pc:spChg chg="add del mod">
+          <ac:chgData name="Louis-Simon Castonguay" userId="12a0b372677e56a6" providerId="LiveId" clId="{B829F0FB-9251-4F38-9864-9D3AC8119E91}" dt="2025-03-09T21:58:53.934" v="1261" actId="20577"/>
+          <ac:spMkLst>
+            <pc:docMk/>
+            <pc:sldMk cId="2049930980" sldId="286"/>
+            <ac:spMk id="7" creationId="{61F7C9DB-68B7-E64F-4A0A-2F8B2E9FB39B}"/>
+          </ac:spMkLst>
+        </pc:spChg>
+        <pc:spChg chg="add mod">
+          <ac:chgData name="Louis-Simon Castonguay" userId="12a0b372677e56a6" providerId="LiveId" clId="{B829F0FB-9251-4F38-9864-9D3AC8119E91}" dt="2025-03-09T22:02:21.339" v="1597" actId="1076"/>
+          <ac:spMkLst>
+            <pc:docMk/>
+            <pc:sldMk cId="2049930980" sldId="286"/>
+            <ac:spMk id="12" creationId="{F16AF770-CD13-D521-ABBC-BDBB2E3CAA9F}"/>
+          </ac:spMkLst>
+        </pc:spChg>
+        <pc:picChg chg="add del">
+          <ac:chgData name="Louis-Simon Castonguay" userId="12a0b372677e56a6" providerId="LiveId" clId="{B829F0FB-9251-4F38-9864-9D3AC8119E91}" dt="2025-03-09T21:52:18.567" v="1029" actId="478"/>
+          <ac:picMkLst>
+            <pc:docMk/>
+            <pc:sldMk cId="2049930980" sldId="286"/>
+            <ac:picMk id="4" creationId="{980152AE-9F1F-1162-8CA2-D451B1C2A069}"/>
+          </ac:picMkLst>
+        </pc:picChg>
+        <pc:picChg chg="add mod">
+          <ac:chgData name="Louis-Simon Castonguay" userId="12a0b372677e56a6" providerId="LiveId" clId="{B829F0FB-9251-4F38-9864-9D3AC8119E91}" dt="2025-03-09T21:59:41.767" v="1271" actId="14100"/>
+          <ac:picMkLst>
+            <pc:docMk/>
+            <pc:sldMk cId="2049930980" sldId="286"/>
+            <ac:picMk id="11" creationId="{DC550F96-EFB2-0140-D665-6370272DAE1F}"/>
+          </ac:picMkLst>
+        </pc:picChg>
+      </pc:sldChg>
+      <pc:sldChg chg="new del">
+        <pc:chgData name="Louis-Simon Castonguay" userId="12a0b372677e56a6" providerId="LiveId" clId="{B829F0FB-9251-4F38-9864-9D3AC8119E91}" dt="2025-03-09T21:50:24.555" v="965" actId="680"/>
+        <pc:sldMkLst>
+          <pc:docMk/>
+          <pc:sldMk cId="2254852845" sldId="286"/>
+        </pc:sldMkLst>
       </pc:sldChg>
     </pc:docChg>
   </pc:docChgLst>
@@ -1066,6 +1137,114 @@
     <p:extLst>
       <p:ext uri="{BB962C8B-B14F-4D97-AF65-F5344CB8AC3E}">
         <p14:creationId xmlns:p14="http://schemas.microsoft.com/office/powerpoint/2010/main" val="2370502197"/>
+      </p:ext>
+    </p:extLst>
+  </p:cSld>
+  <p:clrMapOvr>
+    <a:masterClrMapping/>
+  </p:clrMapOvr>
+</p:notes>
+</file>
+
+<file path=ppt/notesSlides/notesSlide6.xml><?xml version="1.0" encoding="utf-8"?>
+<p:notes xmlns:a="http://schemas.openxmlformats.org/drawingml/2006/main" xmlns:r="http://schemas.openxmlformats.org/officeDocument/2006/relationships" xmlns:p="http://schemas.openxmlformats.org/presentationml/2006/main">
+  <p:cSld>
+    <p:spTree>
+      <p:nvGrpSpPr>
+        <p:cNvPr id="1" name="">
+          <a:extLst>
+            <a:ext uri="{FF2B5EF4-FFF2-40B4-BE49-F238E27FC236}">
+              <a16:creationId xmlns:a16="http://schemas.microsoft.com/office/drawing/2014/main" id="{E23778DE-1C14-328B-12FC-696F91211404}"/>
+            </a:ext>
+          </a:extLst>
+        </p:cNvPr>
+        <p:cNvGrpSpPr/>
+        <p:nvPr/>
+      </p:nvGrpSpPr>
+      <p:grpSpPr>
+        <a:xfrm>
+          <a:off x="0" y="0"/>
+          <a:ext cx="0" cy="0"/>
+          <a:chOff x="0" y="0"/>
+          <a:chExt cx="0" cy="0"/>
+        </a:xfrm>
+      </p:grpSpPr>
+      <p:sp>
+        <p:nvSpPr>
+          <p:cNvPr id="2" name="Espace réservé de l'image de diapositive 1">
+            <a:extLst>
+              <a:ext uri="{FF2B5EF4-FFF2-40B4-BE49-F238E27FC236}">
+                <a16:creationId xmlns:a16="http://schemas.microsoft.com/office/drawing/2014/main" id="{6729BB84-CFF9-7122-CD8F-BC3E57719897}"/>
+              </a:ext>
+            </a:extLst>
+          </p:cNvPr>
+          <p:cNvSpPr>
+            <a:spLocks noGrp="1" noRot="1" noChangeAspect="1"/>
+          </p:cNvSpPr>
+          <p:nvPr>
+            <p:ph type="sldImg"/>
+          </p:nvPr>
+        </p:nvSpPr>
+        <p:spPr/>
+      </p:sp>
+      <p:sp>
+        <p:nvSpPr>
+          <p:cNvPr id="3" name="Espace réservé des notes 2">
+            <a:extLst>
+              <a:ext uri="{FF2B5EF4-FFF2-40B4-BE49-F238E27FC236}">
+                <a16:creationId xmlns:a16="http://schemas.microsoft.com/office/drawing/2014/main" id="{299C15C7-CE5A-1430-8C12-DF2CCA4C6EAB}"/>
+              </a:ext>
+            </a:extLst>
+          </p:cNvPr>
+          <p:cNvSpPr>
+            <a:spLocks noGrp="1"/>
+          </p:cNvSpPr>
+          <p:nvPr>
+            <p:ph type="body" idx="1"/>
+          </p:nvPr>
+        </p:nvSpPr>
+        <p:spPr/>
+        <p:txBody>
+          <a:bodyPr/>
+          <a:lstStyle/>
+          <a:p>
+            <a:endParaRPr lang="fr-FR"/>
+          </a:p>
+        </p:txBody>
+      </p:sp>
+      <p:sp>
+        <p:nvSpPr>
+          <p:cNvPr id="4" name="Espace réservé du numéro de diapositive 3">
+            <a:extLst>
+              <a:ext uri="{FF2B5EF4-FFF2-40B4-BE49-F238E27FC236}">
+                <a16:creationId xmlns:a16="http://schemas.microsoft.com/office/drawing/2014/main" id="{81CD108C-3598-F610-BD0C-D499EF1FC14D}"/>
+              </a:ext>
+            </a:extLst>
+          </p:cNvPr>
+          <p:cNvSpPr>
+            <a:spLocks noGrp="1"/>
+          </p:cNvSpPr>
+          <p:nvPr>
+            <p:ph type="sldNum" sz="quarter" idx="5"/>
+          </p:nvPr>
+        </p:nvSpPr>
+        <p:spPr/>
+        <p:txBody>
+          <a:bodyPr/>
+          <a:lstStyle/>
+          <a:p>
+            <a:fld id="{F07AC4DF-0053-49C1-976A-467CC677364D}" type="slidenum">
+              <a:rPr lang="fr-CA" smtClean="0"/>
+              <a:t>6</a:t>
+            </a:fld>
+            <a:endParaRPr lang="fr-CA"/>
+          </a:p>
+        </p:txBody>
+      </p:sp>
+    </p:spTree>
+    <p:extLst>
+      <p:ext uri="{BB962C8B-B14F-4D97-AF65-F5344CB8AC3E}">
+        <p14:creationId xmlns:p14="http://schemas.microsoft.com/office/powerpoint/2010/main" val="2985352373"/>
       </p:ext>
     </p:extLst>
   </p:cSld>
@@ -9818,6 +9997,722 @@
 </p:sld>
 </file>
 
+<file path=ppt/slides/slide6.xml><?xml version="1.0" encoding="utf-8"?>
+<p:sld xmlns:a="http://schemas.openxmlformats.org/drawingml/2006/main" xmlns:r="http://schemas.openxmlformats.org/officeDocument/2006/relationships" xmlns:p="http://schemas.openxmlformats.org/presentationml/2006/main">
+  <p:cSld>
+    <p:spTree>
+      <p:nvGrpSpPr>
+        <p:cNvPr id="1" name="">
+          <a:extLst>
+            <a:ext uri="{FF2B5EF4-FFF2-40B4-BE49-F238E27FC236}">
+              <a16:creationId xmlns:a16="http://schemas.microsoft.com/office/drawing/2014/main" id="{2F845675-1EAA-8FE3-559A-E37ADD10FB72}"/>
+            </a:ext>
+          </a:extLst>
+        </p:cNvPr>
+        <p:cNvGrpSpPr/>
+        <p:nvPr/>
+      </p:nvGrpSpPr>
+      <p:grpSpPr>
+        <a:xfrm>
+          <a:off x="0" y="0"/>
+          <a:ext cx="0" cy="0"/>
+          <a:chOff x="0" y="0"/>
+          <a:chExt cx="0" cy="0"/>
+        </a:xfrm>
+      </p:grpSpPr>
+      <p:sp>
+        <p:nvSpPr>
+          <p:cNvPr id="6" name="Sous-titre 2">
+            <a:extLst>
+              <a:ext uri="{FF2B5EF4-FFF2-40B4-BE49-F238E27FC236}">
+                <a16:creationId xmlns:a16="http://schemas.microsoft.com/office/drawing/2014/main" id="{CF94B614-7131-BEFB-E68D-FBA88008592B}"/>
+              </a:ext>
+            </a:extLst>
+          </p:cNvPr>
+          <p:cNvSpPr txBox="1">
+            <a:spLocks/>
+          </p:cNvSpPr>
+          <p:nvPr>
+            <p:custDataLst>
+              <p:tags r:id="rId1"/>
+            </p:custDataLst>
+          </p:nvPr>
+        </p:nvSpPr>
+        <p:spPr>
+          <a:xfrm>
+            <a:off x="3888377" y="3771106"/>
+            <a:ext cx="9144000" cy="1655762"/>
+          </a:xfrm>
+          <a:prstGeom prst="rect">
+            <a:avLst/>
+          </a:prstGeom>
+        </p:spPr>
+        <p:txBody>
+          <a:bodyPr vert="horz" lIns="91440" tIns="45720" rIns="91440" bIns="45720" rtlCol="0">
+            <a:normAutofit/>
+          </a:bodyPr>
+          <a:lstStyle>
+            <a:lvl1pPr marL="228600" indent="-228600" algn="l" defTabSz="914400" rtl="0" eaLnBrk="1" latinLnBrk="0" hangingPunct="1">
+              <a:lnSpc>
+                <a:spcPct val="100000"/>
+              </a:lnSpc>
+              <a:spcBef>
+                <a:spcPts val="1000"/>
+              </a:spcBef>
+              <a:buClr>
+                <a:schemeClr val="accent2"/>
+              </a:buClr>
+              <a:buFont typeface="Arial" panose="020B0604020202020204" pitchFamily="34" charset="0"/>
+              <a:buChar char="•"/>
+              <a:defRPr sz="1800" kern="1200">
+                <a:solidFill>
+                  <a:schemeClr val="tx1">
+                    <a:lumMod val="85000"/>
+                    <a:lumOff val="15000"/>
+                  </a:schemeClr>
+                </a:solidFill>
+                <a:latin typeface="+mn-lt"/>
+                <a:ea typeface="+mn-ea"/>
+                <a:cs typeface="+mn-cs"/>
+              </a:defRPr>
+            </a:lvl1pPr>
+            <a:lvl2pPr marL="457200" indent="-228600" algn="l" defTabSz="914400" rtl="0" eaLnBrk="1" latinLnBrk="0" hangingPunct="1">
+              <a:lnSpc>
+                <a:spcPct val="100000"/>
+              </a:lnSpc>
+              <a:spcBef>
+                <a:spcPts val="1000"/>
+              </a:spcBef>
+              <a:buClr>
+                <a:schemeClr val="accent2"/>
+              </a:buClr>
+              <a:buFont typeface="Arial" panose="020B0604020202020204" pitchFamily="34" charset="0"/>
+              <a:buChar char="•"/>
+              <a:defRPr sz="1600" kern="1200">
+                <a:solidFill>
+                  <a:schemeClr val="tx1">
+                    <a:lumMod val="85000"/>
+                    <a:lumOff val="15000"/>
+                  </a:schemeClr>
+                </a:solidFill>
+                <a:latin typeface="+mn-lt"/>
+                <a:ea typeface="+mn-ea"/>
+                <a:cs typeface="+mn-cs"/>
+              </a:defRPr>
+            </a:lvl2pPr>
+            <a:lvl3pPr marL="685800" indent="-228600" algn="l" defTabSz="914400" rtl="0" eaLnBrk="1" latinLnBrk="0" hangingPunct="1">
+              <a:lnSpc>
+                <a:spcPct val="100000"/>
+              </a:lnSpc>
+              <a:spcBef>
+                <a:spcPts val="1000"/>
+              </a:spcBef>
+              <a:buClr>
+                <a:schemeClr val="accent2"/>
+              </a:buClr>
+              <a:buFont typeface="Arial" panose="020B0604020202020204" pitchFamily="34" charset="0"/>
+              <a:buChar char="•"/>
+              <a:defRPr sz="1600" kern="1200">
+                <a:solidFill>
+                  <a:schemeClr val="tx1">
+                    <a:lumMod val="85000"/>
+                    <a:lumOff val="15000"/>
+                  </a:schemeClr>
+                </a:solidFill>
+                <a:latin typeface="+mn-lt"/>
+                <a:ea typeface="+mn-ea"/>
+                <a:cs typeface="+mn-cs"/>
+              </a:defRPr>
+            </a:lvl3pPr>
+            <a:lvl4pPr marL="914400" indent="-228600" algn="l" defTabSz="914400" rtl="0" eaLnBrk="1" latinLnBrk="0" hangingPunct="1">
+              <a:lnSpc>
+                <a:spcPct val="100000"/>
+              </a:lnSpc>
+              <a:spcBef>
+                <a:spcPts val="1000"/>
+              </a:spcBef>
+              <a:buClr>
+                <a:schemeClr val="accent2"/>
+              </a:buClr>
+              <a:buFont typeface="Arial" panose="020B0604020202020204" pitchFamily="34" charset="0"/>
+              <a:buChar char="•"/>
+              <a:defRPr sz="1600" kern="1200">
+                <a:solidFill>
+                  <a:schemeClr val="tx1">
+                    <a:lumMod val="85000"/>
+                    <a:lumOff val="15000"/>
+                  </a:schemeClr>
+                </a:solidFill>
+                <a:latin typeface="+mn-lt"/>
+                <a:ea typeface="+mn-ea"/>
+                <a:cs typeface="+mn-cs"/>
+              </a:defRPr>
+            </a:lvl4pPr>
+            <a:lvl5pPr marL="1143000" indent="-228600" algn="l" defTabSz="914400" rtl="0" eaLnBrk="1" latinLnBrk="0" hangingPunct="1">
+              <a:lnSpc>
+                <a:spcPct val="100000"/>
+              </a:lnSpc>
+              <a:spcBef>
+                <a:spcPts val="1000"/>
+              </a:spcBef>
+              <a:buClr>
+                <a:schemeClr val="accent2"/>
+              </a:buClr>
+              <a:buFont typeface="Arial" panose="020B0604020202020204" pitchFamily="34" charset="0"/>
+              <a:buChar char="•"/>
+              <a:defRPr sz="1600" kern="1200">
+                <a:solidFill>
+                  <a:schemeClr val="tx1">
+                    <a:lumMod val="85000"/>
+                    <a:lumOff val="15000"/>
+                  </a:schemeClr>
+                </a:solidFill>
+                <a:latin typeface="+mn-lt"/>
+                <a:ea typeface="+mn-ea"/>
+                <a:cs typeface="+mn-cs"/>
+              </a:defRPr>
+            </a:lvl5pPr>
+            <a:lvl6pPr marL="1312863" indent="-228600" algn="l" defTabSz="914400" rtl="0" eaLnBrk="1" latinLnBrk="0" hangingPunct="1">
+              <a:lnSpc>
+                <a:spcPct val="100000"/>
+              </a:lnSpc>
+              <a:spcBef>
+                <a:spcPts val="1000"/>
+              </a:spcBef>
+              <a:buClr>
+                <a:schemeClr val="accent2"/>
+              </a:buClr>
+              <a:buFont typeface="Arial" panose="020B0604020202020204" pitchFamily="34" charset="0"/>
+              <a:buChar char="•"/>
+              <a:defRPr sz="1600" kern="1200">
+                <a:solidFill>
+                  <a:schemeClr val="tx1"/>
+                </a:solidFill>
+                <a:latin typeface="+mn-lt"/>
+                <a:ea typeface="+mn-ea"/>
+                <a:cs typeface="+mn-cs"/>
+              </a:defRPr>
+            </a:lvl6pPr>
+            <a:lvl7pPr marL="1484313" indent="-228600" algn="l" defTabSz="914400" rtl="0" eaLnBrk="1" latinLnBrk="0" hangingPunct="1">
+              <a:lnSpc>
+                <a:spcPct val="100000"/>
+              </a:lnSpc>
+              <a:spcBef>
+                <a:spcPts val="1000"/>
+              </a:spcBef>
+              <a:buClr>
+                <a:schemeClr val="accent2"/>
+              </a:buClr>
+              <a:buFont typeface="Arial" panose="020B0604020202020204" pitchFamily="34" charset="0"/>
+              <a:buChar char="•"/>
+              <a:defRPr sz="1600" kern="1200">
+                <a:solidFill>
+                  <a:schemeClr val="tx1"/>
+                </a:solidFill>
+                <a:latin typeface="+mn-lt"/>
+                <a:ea typeface="+mn-ea"/>
+                <a:cs typeface="+mn-cs"/>
+              </a:defRPr>
+            </a:lvl7pPr>
+            <a:lvl8pPr marL="1657350" indent="-228600" algn="l" defTabSz="914400" rtl="0" eaLnBrk="1" latinLnBrk="0" hangingPunct="1">
+              <a:lnSpc>
+                <a:spcPct val="100000"/>
+              </a:lnSpc>
+              <a:spcBef>
+                <a:spcPts val="1000"/>
+              </a:spcBef>
+              <a:buClr>
+                <a:schemeClr val="accent2"/>
+              </a:buClr>
+              <a:buFont typeface="Arial" panose="020B0604020202020204" pitchFamily="34" charset="0"/>
+              <a:buChar char="•"/>
+              <a:defRPr sz="1600" kern="1200" baseline="0">
+                <a:solidFill>
+                  <a:schemeClr val="tx1"/>
+                </a:solidFill>
+                <a:latin typeface="+mn-lt"/>
+                <a:ea typeface="+mn-ea"/>
+                <a:cs typeface="+mn-cs"/>
+              </a:defRPr>
+            </a:lvl8pPr>
+            <a:lvl9pPr marL="1882775" indent="-228600" algn="l" defTabSz="914400" rtl="0" eaLnBrk="1" latinLnBrk="0" hangingPunct="1">
+              <a:lnSpc>
+                <a:spcPct val="100000"/>
+              </a:lnSpc>
+              <a:spcBef>
+                <a:spcPts val="1000"/>
+              </a:spcBef>
+              <a:buClr>
+                <a:schemeClr val="accent2"/>
+              </a:buClr>
+              <a:buFont typeface="Arial" panose="020B0604020202020204" pitchFamily="34" charset="0"/>
+              <a:buChar char="•"/>
+              <a:defRPr sz="1600" kern="1200" baseline="0">
+                <a:solidFill>
+                  <a:schemeClr val="tx1"/>
+                </a:solidFill>
+                <a:latin typeface="+mn-lt"/>
+                <a:ea typeface="+mn-ea"/>
+                <a:cs typeface="+mn-cs"/>
+              </a:defRPr>
+            </a:lvl9pPr>
+          </a:lstStyle>
+          <a:p>
+            <a:endParaRPr lang="fr-CA"/>
+          </a:p>
+        </p:txBody>
+      </p:sp>
+      <p:sp>
+        <p:nvSpPr>
+          <p:cNvPr id="8" name="ZoneTexte 7">
+            <a:extLst>
+              <a:ext uri="{FF2B5EF4-FFF2-40B4-BE49-F238E27FC236}">
+                <a16:creationId xmlns:a16="http://schemas.microsoft.com/office/drawing/2014/main" id="{EEDFF46B-5BCD-0EFA-85DC-4C8531C94BCD}"/>
+              </a:ext>
+            </a:extLst>
+          </p:cNvPr>
+          <p:cNvSpPr txBox="1"/>
+          <p:nvPr>
+            <p:custDataLst>
+              <p:tags r:id="rId2"/>
+            </p:custDataLst>
+          </p:nvPr>
+        </p:nvSpPr>
+        <p:spPr>
+          <a:xfrm>
+            <a:off x="0" y="6377226"/>
+            <a:ext cx="13116353" cy="594875"/>
+          </a:xfrm>
+          <a:prstGeom prst="rect">
+            <a:avLst/>
+          </a:prstGeom>
+        </p:spPr>
+        <p:txBody>
+          <a:bodyPr vert="horz" lIns="91440" tIns="45720" rIns="91440" bIns="45720" rtlCol="0" anchor="ctr">
+            <a:noAutofit/>
+          </a:bodyPr>
+          <a:lstStyle/>
+          <a:p>
+            <a:r>
+              <a:rPr lang="fr-CA">
+                <a:solidFill>
+                  <a:schemeClr val="tx2"/>
+                </a:solidFill>
+              </a:rPr>
+              <a:t>MEC 8211 - Vérification et validation en modélisation numérique</a:t>
+            </a:r>
+          </a:p>
+        </p:txBody>
+      </p:sp>
+      <p:cxnSp>
+        <p:nvCxnSpPr>
+          <p:cNvPr id="15" name="Connecteur droit 14">
+            <a:extLst>
+              <a:ext uri="{FF2B5EF4-FFF2-40B4-BE49-F238E27FC236}">
+                <a16:creationId xmlns:a16="http://schemas.microsoft.com/office/drawing/2014/main" id="{17F41F89-29AD-E476-50AC-903800FE81BC}"/>
+              </a:ext>
+            </a:extLst>
+          </p:cNvPr>
+          <p:cNvCxnSpPr>
+            <a:cxnSpLocks/>
+          </p:cNvCxnSpPr>
+          <p:nvPr>
+            <p:custDataLst>
+              <p:tags r:id="rId3"/>
+            </p:custDataLst>
+          </p:nvPr>
+        </p:nvCxnSpPr>
+        <p:spPr>
+          <a:xfrm>
+            <a:off x="0" y="873760"/>
+            <a:ext cx="12192000" cy="0"/>
+          </a:xfrm>
+          <a:prstGeom prst="line">
+            <a:avLst/>
+          </a:prstGeom>
+          <a:ln w="28575">
+            <a:solidFill>
+              <a:srgbClr val="0070C0"/>
+            </a:solidFill>
+          </a:ln>
+        </p:spPr>
+        <p:style>
+          <a:lnRef idx="1">
+            <a:schemeClr val="accent1"/>
+          </a:lnRef>
+          <a:fillRef idx="0">
+            <a:schemeClr val="accent1"/>
+          </a:fillRef>
+          <a:effectRef idx="0">
+            <a:schemeClr val="accent1"/>
+          </a:effectRef>
+          <a:fontRef idx="minor">
+            <a:schemeClr val="tx1"/>
+          </a:fontRef>
+        </p:style>
+      </p:cxnSp>
+      <p:sp>
+        <p:nvSpPr>
+          <p:cNvPr id="3" name="ZoneTexte 2">
+            <a:extLst>
+              <a:ext uri="{FF2B5EF4-FFF2-40B4-BE49-F238E27FC236}">
+                <a16:creationId xmlns:a16="http://schemas.microsoft.com/office/drawing/2014/main" id="{4352DFF7-03E4-82CB-AFEF-08DCAC3697A6}"/>
+              </a:ext>
+            </a:extLst>
+          </p:cNvPr>
+          <p:cNvSpPr txBox="1"/>
+          <p:nvPr>
+            <p:custDataLst>
+              <p:tags r:id="rId4"/>
+            </p:custDataLst>
+          </p:nvPr>
+        </p:nvSpPr>
+        <p:spPr>
+          <a:xfrm>
+            <a:off x="233679" y="227429"/>
+            <a:ext cx="11142243" cy="646331"/>
+          </a:xfrm>
+          <a:prstGeom prst="rect">
+            <a:avLst/>
+          </a:prstGeom>
+          <a:noFill/>
+        </p:spPr>
+        <p:txBody>
+          <a:bodyPr wrap="square">
+            <a:spAutoFit/>
+          </a:bodyPr>
+          <a:lstStyle/>
+          <a:p>
+            <a:r>
+              <a:rPr lang="fr-CA" sz="3600" dirty="0"/>
+              <a:t>F) Tracé de la solution</a:t>
+            </a:r>
+          </a:p>
+        </p:txBody>
+      </p:sp>
+      <mc:AlternateContent xmlns:mc="http://schemas.openxmlformats.org/markup-compatibility/2006">
+        <mc:Choice xmlns:a14="http://schemas.microsoft.com/office/drawing/2010/main" Requires="a14">
+          <p:sp>
+            <p:nvSpPr>
+              <p:cNvPr id="7" name="ZoneTexte 6">
+                <a:extLst>
+                  <a:ext uri="{FF2B5EF4-FFF2-40B4-BE49-F238E27FC236}">
+                    <a16:creationId xmlns:a16="http://schemas.microsoft.com/office/drawing/2014/main" id="{61F7C9DB-68B7-E64F-4A0A-2F8B2E9FB39B}"/>
+                  </a:ext>
+                </a:extLst>
+              </p:cNvPr>
+              <p:cNvSpPr txBox="1"/>
+              <p:nvPr>
+                <p:custDataLst>
+                  <p:tags r:id="rId5"/>
+                </p:custDataLst>
+              </p:nvPr>
+            </p:nvSpPr>
+            <p:spPr>
+              <a:xfrm>
+                <a:off x="374286" y="554203"/>
+                <a:ext cx="11443064" cy="4154984"/>
+              </a:xfrm>
+              <a:prstGeom prst="rect">
+                <a:avLst/>
+              </a:prstGeom>
+              <a:noFill/>
+            </p:spPr>
+            <p:txBody>
+              <a:bodyPr wrap="square" lIns="91440" tIns="45720" rIns="91440" bIns="45720" anchor="t">
+                <a:spAutoFit/>
+              </a:bodyPr>
+              <a:lstStyle/>
+              <a:p>
+                <a:pPr>
+                  <a:buClr>
+                    <a:srgbClr val="0070C0"/>
+                  </a:buClr>
+                </a:pPr>
+                <a:endParaRPr lang="fr-CA" sz="2400" dirty="0"/>
+              </a:p>
+              <a:p>
+                <a:pPr marL="285750" indent="-285750">
+                  <a:buClr>
+                    <a:srgbClr val="0070C0"/>
+                  </a:buClr>
+                  <a:buFont typeface="Wingdings" panose="05000000000000000000" pitchFamily="2" charset="2"/>
+                  <a:buChar char="§"/>
+                </a:pPr>
+                <a:r>
+                  <a:rPr lang="fr-CA" sz="2400" dirty="0"/>
+                  <a:t>Solution pour un maillage de 11 nœuds et pour t de 0 à </a:t>
+                </a:r>
+                <a14:m>
+                  <m:oMath xmlns:m="http://schemas.openxmlformats.org/officeDocument/2006/math">
+                    <m:sSup>
+                      <m:sSupPr>
+                        <m:ctrlPr>
+                          <a:rPr lang="fr-CA" sz="2400" i="1" smtClean="0">
+                            <a:latin typeface="Cambria Math" panose="02040503050406030204" pitchFamily="18" charset="0"/>
+                          </a:rPr>
+                        </m:ctrlPr>
+                      </m:sSupPr>
+                      <m:e>
+                        <m:r>
+                          <a:rPr lang="fr-CA" sz="2400" b="0" i="1" smtClean="0">
+                            <a:latin typeface="Cambria Math" panose="02040503050406030204" pitchFamily="18" charset="0"/>
+                          </a:rPr>
+                          <m:t>10</m:t>
+                        </m:r>
+                      </m:e>
+                      <m:sup>
+                        <m:r>
+                          <a:rPr lang="fr-CA" sz="2400" b="0" i="1" smtClean="0">
+                            <a:latin typeface="Cambria Math" panose="02040503050406030204" pitchFamily="18" charset="0"/>
+                          </a:rPr>
+                          <m:t>9</m:t>
+                        </m:r>
+                      </m:sup>
+                    </m:sSup>
+                  </m:oMath>
+                </a14:m>
+                <a:r>
+                  <a:rPr lang="fr-CA" sz="2400" dirty="0"/>
+                  <a:t>secondes. Notre code fonctionne en mois, alors le temps choisi est de 0 à 1522 mois avec un pas de temps de 6 mois. On obtient le graphique suivant</a:t>
+                </a:r>
+              </a:p>
+              <a:p>
+                <a:pPr marL="285750" indent="-285750">
+                  <a:buClr>
+                    <a:srgbClr val="0070C0"/>
+                  </a:buClr>
+                  <a:buFont typeface="Wingdings" panose="05000000000000000000" pitchFamily="2" charset="2"/>
+                  <a:buChar char="§"/>
+                </a:pPr>
+                <a:endParaRPr lang="fr-CA" sz="2400" dirty="0"/>
+              </a:p>
+              <a:p>
+                <a:pPr marL="285750" indent="-285750">
+                  <a:buClr>
+                    <a:srgbClr val="0070C0"/>
+                  </a:buClr>
+                  <a:buFont typeface="Wingdings" panose="05000000000000000000" pitchFamily="2" charset="2"/>
+                  <a:buChar char="§"/>
+                </a:pPr>
+                <a:endParaRPr lang="fr-CA" sz="2400" dirty="0"/>
+              </a:p>
+              <a:p>
+                <a:pPr marL="285750" indent="-285750">
+                  <a:buClr>
+                    <a:srgbClr val="0070C0"/>
+                  </a:buClr>
+                  <a:buFont typeface="Wingdings" panose="05000000000000000000" pitchFamily="2" charset="2"/>
+                  <a:buChar char="§"/>
+                </a:pPr>
+                <a:endParaRPr lang="fr-CA" sz="2400" dirty="0"/>
+              </a:p>
+              <a:p>
+                <a:pPr marL="285750" indent="-285750">
+                  <a:buClr>
+                    <a:srgbClr val="0070C0"/>
+                  </a:buClr>
+                  <a:buFont typeface="Wingdings" panose="05000000000000000000" pitchFamily="2" charset="2"/>
+                  <a:buChar char="§"/>
+                </a:pPr>
+                <a:endParaRPr lang="fr-CA" sz="2400" dirty="0"/>
+              </a:p>
+              <a:p>
+                <a:pPr marL="285750" indent="-285750">
+                  <a:buClr>
+                    <a:srgbClr val="0070C0"/>
+                  </a:buClr>
+                  <a:buFont typeface="Wingdings" panose="05000000000000000000" pitchFamily="2" charset="2"/>
+                  <a:buChar char="§"/>
+                </a:pPr>
+                <a:endParaRPr lang="fr-CA" sz="2400" dirty="0"/>
+              </a:p>
+              <a:p>
+                <a:pPr marL="285750" indent="-285750">
+                  <a:buClr>
+                    <a:srgbClr val="0070C0"/>
+                  </a:buClr>
+                  <a:buFont typeface="Wingdings" panose="05000000000000000000" pitchFamily="2" charset="2"/>
+                  <a:buChar char="§"/>
+                </a:pPr>
+                <a:endParaRPr lang="fr-CA" sz="2400" dirty="0"/>
+              </a:p>
+              <a:p>
+                <a:pPr marL="285750" indent="-285750">
+                  <a:buClr>
+                    <a:srgbClr val="0070C0"/>
+                  </a:buClr>
+                  <a:buFont typeface="Wingdings" panose="05000000000000000000" pitchFamily="2" charset="2"/>
+                  <a:buChar char="§"/>
+                </a:pPr>
+                <a:endParaRPr lang="fr-CA" sz="2400" dirty="0"/>
+              </a:p>
+            </p:txBody>
+          </p:sp>
+        </mc:Choice>
+        <mc:Fallback>
+          <p:sp>
+            <p:nvSpPr>
+              <p:cNvPr id="7" name="ZoneTexte 6">
+                <a:extLst>
+                  <a:ext uri="{FF2B5EF4-FFF2-40B4-BE49-F238E27FC236}">
+                    <a16:creationId xmlns:a16="http://schemas.microsoft.com/office/drawing/2014/main" id="{61F7C9DB-68B7-E64F-4A0A-2F8B2E9FB39B}"/>
+                  </a:ext>
+                </a:extLst>
+              </p:cNvPr>
+              <p:cNvSpPr txBox="1">
+                <a:spLocks noRot="1" noChangeAspect="1" noMove="1" noResize="1" noEditPoints="1" noAdjustHandles="1" noChangeArrowheads="1" noChangeShapeType="1" noTextEdit="1"/>
+              </p:cNvSpPr>
+              <p:nvPr>
+                <p:custDataLst>
+                  <p:tags r:id="rId5"/>
+                </p:custDataLst>
+              </p:nvPr>
+            </p:nvSpPr>
+            <p:spPr>
+              <a:xfrm>
+                <a:off x="374286" y="554203"/>
+                <a:ext cx="11443064" cy="4154984"/>
+              </a:xfrm>
+              <a:prstGeom prst="rect">
+                <a:avLst/>
+              </a:prstGeom>
+              <a:blipFill>
+                <a:blip r:embed="rId8"/>
+                <a:stretch>
+                  <a:fillRect l="-692"/>
+                </a:stretch>
+              </a:blipFill>
+            </p:spPr>
+            <p:txBody>
+              <a:bodyPr/>
+              <a:lstStyle/>
+              <a:p>
+                <a:r>
+                  <a:rPr lang="fr-CA">
+                    <a:noFill/>
+                  </a:rPr>
+                  <a:t> </a:t>
+                </a:r>
+              </a:p>
+            </p:txBody>
+          </p:sp>
+        </mc:Fallback>
+      </mc:AlternateContent>
+      <p:sp>
+        <p:nvSpPr>
+          <p:cNvPr id="9" name="Espace réservé du numéro de diapositive 8">
+            <a:extLst>
+              <a:ext uri="{FF2B5EF4-FFF2-40B4-BE49-F238E27FC236}">
+                <a16:creationId xmlns:a16="http://schemas.microsoft.com/office/drawing/2014/main" id="{995CB316-6B2D-4D96-7B48-9E6F91739250}"/>
+              </a:ext>
+            </a:extLst>
+          </p:cNvPr>
+          <p:cNvSpPr>
+            <a:spLocks noGrp="1"/>
+          </p:cNvSpPr>
+          <p:nvPr>
+            <p:ph type="sldNum" sz="quarter" idx="12"/>
+          </p:nvPr>
+        </p:nvSpPr>
+        <p:spPr/>
+        <p:txBody>
+          <a:bodyPr/>
+          <a:lstStyle/>
+          <a:p>
+            <a:fld id="{60C5136D-6379-4117-9737-E06B06A1D370}" type="slidenum">
+              <a:rPr lang="fr-CA" smtClean="0"/>
+              <a:t>6</a:t>
+            </a:fld>
+            <a:endParaRPr lang="fr-FR"/>
+          </a:p>
+        </p:txBody>
+      </p:sp>
+      <p:pic>
+        <p:nvPicPr>
+          <p:cNvPr id="11" name="Image 10" descr="Une image contenant texte, diagramme, ligne, Tracé&#10;&#10;Le contenu généré par l’IA peut être incorrect.">
+            <a:extLst>
+              <a:ext uri="{FF2B5EF4-FFF2-40B4-BE49-F238E27FC236}">
+                <a16:creationId xmlns:a16="http://schemas.microsoft.com/office/drawing/2014/main" id="{DC550F96-EFB2-0140-D665-6370272DAE1F}"/>
+              </a:ext>
+            </a:extLst>
+          </p:cNvPr>
+          <p:cNvPicPr>
+            <a:picLocks noChangeAspect="1"/>
+          </p:cNvPicPr>
+          <p:nvPr/>
+        </p:nvPicPr>
+        <p:blipFill>
+          <a:blip r:embed="rId9">
+            <a:extLst>
+              <a:ext uri="{28A0092B-C50C-407E-A947-70E740481C1C}">
+                <a14:useLocalDpi xmlns:a14="http://schemas.microsoft.com/office/drawing/2010/main" val="0"/>
+              </a:ext>
+            </a:extLst>
+          </a:blip>
+          <a:stretch>
+            <a:fillRect/>
+          </a:stretch>
+        </p:blipFill>
+        <p:spPr>
+          <a:xfrm>
+            <a:off x="374286" y="2143508"/>
+            <a:ext cx="5947856" cy="4163500"/>
+          </a:xfrm>
+          <a:prstGeom prst="rect">
+            <a:avLst/>
+          </a:prstGeom>
+        </p:spPr>
+      </p:pic>
+      <p:sp>
+        <p:nvSpPr>
+          <p:cNvPr id="12" name="ZoneTexte 11">
+            <a:extLst>
+              <a:ext uri="{FF2B5EF4-FFF2-40B4-BE49-F238E27FC236}">
+                <a16:creationId xmlns:a16="http://schemas.microsoft.com/office/drawing/2014/main" id="{F16AF770-CD13-D521-ABBC-BDBB2E3CAA9F}"/>
+              </a:ext>
+            </a:extLst>
+          </p:cNvPr>
+          <p:cNvSpPr txBox="1"/>
+          <p:nvPr/>
+        </p:nvSpPr>
+        <p:spPr>
+          <a:xfrm>
+            <a:off x="6462749" y="2082084"/>
+            <a:ext cx="5120311" cy="1477328"/>
+          </a:xfrm>
+          <a:prstGeom prst="rect">
+            <a:avLst/>
+          </a:prstGeom>
+          <a:noFill/>
+        </p:spPr>
+        <p:txBody>
+          <a:bodyPr wrap="square" rtlCol="0">
+            <a:spAutoFit/>
+          </a:bodyPr>
+          <a:lstStyle/>
+          <a:p>
+            <a:pPr algn="just"/>
+            <a:r>
+              <a:rPr lang="fr-CA" dirty="0"/>
+              <a:t>On observe que la concentration augmente lorsqu’on se rapproche de la paroi extérieure du pilier. Pour le nœud 10 (paroi extérieure) la concentration est exactement de 20 mol/m^3 comme l’indique la condition de Dirichlet</a:t>
+            </a:r>
+          </a:p>
+        </p:txBody>
+      </p:sp>
+    </p:spTree>
+    <p:extLst>
+      <p:ext uri="{BB962C8B-B14F-4D97-AF65-F5344CB8AC3E}">
+        <p14:creationId xmlns:p14="http://schemas.microsoft.com/office/powerpoint/2010/main" val="2049930980"/>
+      </p:ext>
+    </p:extLst>
+  </p:cSld>
+  <p:clrMapOvr>
+    <a:masterClrMapping/>
+  </p:clrMapOvr>
+</p:sld>
+</file>
+
 <file path=ppt/tags/tag1.xml><?xml version="1.0" encoding="utf-8"?>
 <p:tagLst xmlns:a="http://schemas.openxmlformats.org/drawingml/2006/main" xmlns:r="http://schemas.openxmlformats.org/officeDocument/2006/relationships" xmlns:p="http://schemas.openxmlformats.org/presentationml/2006/main">
   <p:tag name="NUM" val="1"/>
@@ -9926,9 +10821,39 @@
 </p:tagLst>
 </file>
 
+<file path=ppt/tags/tag26.xml><?xml version="1.0" encoding="utf-8"?>
+<p:tagLst xmlns:a="http://schemas.openxmlformats.org/drawingml/2006/main" xmlns:r="http://schemas.openxmlformats.org/officeDocument/2006/relationships" xmlns:p="http://schemas.openxmlformats.org/presentationml/2006/main">
+  <p:tag name="NUM" val="1"/>
+</p:tagLst>
+</file>
+
+<file path=ppt/tags/tag27.xml><?xml version="1.0" encoding="utf-8"?>
+<p:tagLst xmlns:a="http://schemas.openxmlformats.org/drawingml/2006/main" xmlns:r="http://schemas.openxmlformats.org/officeDocument/2006/relationships" xmlns:p="http://schemas.openxmlformats.org/presentationml/2006/main">
+  <p:tag name="NUM" val="2"/>
+</p:tagLst>
+</file>
+
+<file path=ppt/tags/tag28.xml><?xml version="1.0" encoding="utf-8"?>
+<p:tagLst xmlns:a="http://schemas.openxmlformats.org/drawingml/2006/main" xmlns:r="http://schemas.openxmlformats.org/officeDocument/2006/relationships" xmlns:p="http://schemas.openxmlformats.org/presentationml/2006/main">
+  <p:tag name="NUM" val="3"/>
+</p:tagLst>
+</file>
+
+<file path=ppt/tags/tag29.xml><?xml version="1.0" encoding="utf-8"?>
+<p:tagLst xmlns:a="http://schemas.openxmlformats.org/drawingml/2006/main" xmlns:r="http://schemas.openxmlformats.org/officeDocument/2006/relationships" xmlns:p="http://schemas.openxmlformats.org/presentationml/2006/main">
+  <p:tag name="NUM" val="4"/>
+</p:tagLst>
+</file>
+
 <file path=ppt/tags/tag3.xml><?xml version="1.0" encoding="utf-8"?>
 <p:tagLst xmlns:a="http://schemas.openxmlformats.org/drawingml/2006/main" xmlns:r="http://schemas.openxmlformats.org/officeDocument/2006/relationships" xmlns:p="http://schemas.openxmlformats.org/presentationml/2006/main">
   <p:tag name="NUM" val="3"/>
+</p:tagLst>
+</file>
+
+<file path=ppt/tags/tag30.xml><?xml version="1.0" encoding="utf-8"?>
+<p:tagLst xmlns:a="http://schemas.openxmlformats.org/drawingml/2006/main" xmlns:r="http://schemas.openxmlformats.org/officeDocument/2006/relationships" xmlns:p="http://schemas.openxmlformats.org/presentationml/2006/main">
+  <p:tag name="NUM" val="5"/>
 </p:tagLst>
 </file>
 

</xml_diff>